<commit_message>
custom model training for boarding pass OCR
</commit_message>
<xml_diff>
--- a/material_preparation_step/temp/my_digital_id.pptx
+++ b/material_preparation_step/temp/my_digital_id.pptx
@@ -104,6 +104,11 @@
       </a:defRPr>
     </a:lvl9pPr>
   </p:defaultTextStyle>
+  <p:extLst>
+    <p:ext uri="{EFAFB233-063F-42B5-8137-9DF3F51BA10A}">
+      <p15:sldGuideLst xmlns:p15="http://schemas.microsoft.com/office/powerpoint/2012/main"/>
+    </p:ext>
+  </p:extLst>
 </p:presentation>
 </file>
 
@@ -254,7 +259,7 @@
           <a:p>
             <a:fld id="{AE4F0B04-D713-46B1-B83F-3E09751D5FCD}" type="datetimeFigureOut">
               <a:rPr lang="de-DE" smtClean="0"/>
-              <a:t>22.05.2024</a:t>
+              <a:t>23.05.2024</a:t>
             </a:fld>
             <a:endParaRPr lang="de-DE"/>
           </a:p>
@@ -452,7 +457,7 @@
           <a:p>
             <a:fld id="{AE4F0B04-D713-46B1-B83F-3E09751D5FCD}" type="datetimeFigureOut">
               <a:rPr lang="de-DE" smtClean="0"/>
-              <a:t>22.05.2024</a:t>
+              <a:t>23.05.2024</a:t>
             </a:fld>
             <a:endParaRPr lang="de-DE"/>
           </a:p>
@@ -660,7 +665,7 @@
           <a:p>
             <a:fld id="{AE4F0B04-D713-46B1-B83F-3E09751D5FCD}" type="datetimeFigureOut">
               <a:rPr lang="de-DE" smtClean="0"/>
-              <a:t>22.05.2024</a:t>
+              <a:t>23.05.2024</a:t>
             </a:fld>
             <a:endParaRPr lang="de-DE"/>
           </a:p>
@@ -858,7 +863,7 @@
           <a:p>
             <a:fld id="{AE4F0B04-D713-46B1-B83F-3E09751D5FCD}" type="datetimeFigureOut">
               <a:rPr lang="de-DE" smtClean="0"/>
-              <a:t>22.05.2024</a:t>
+              <a:t>23.05.2024</a:t>
             </a:fld>
             <a:endParaRPr lang="de-DE"/>
           </a:p>
@@ -1133,7 +1138,7 @@
           <a:p>
             <a:fld id="{AE4F0B04-D713-46B1-B83F-3E09751D5FCD}" type="datetimeFigureOut">
               <a:rPr lang="de-DE" smtClean="0"/>
-              <a:t>22.05.2024</a:t>
+              <a:t>23.05.2024</a:t>
             </a:fld>
             <a:endParaRPr lang="de-DE"/>
           </a:p>
@@ -1398,7 +1403,7 @@
           <a:p>
             <a:fld id="{AE4F0B04-D713-46B1-B83F-3E09751D5FCD}" type="datetimeFigureOut">
               <a:rPr lang="de-DE" smtClean="0"/>
-              <a:t>22.05.2024</a:t>
+              <a:t>23.05.2024</a:t>
             </a:fld>
             <a:endParaRPr lang="de-DE"/>
           </a:p>
@@ -1810,7 +1815,7 @@
           <a:p>
             <a:fld id="{AE4F0B04-D713-46B1-B83F-3E09751D5FCD}" type="datetimeFigureOut">
               <a:rPr lang="de-DE" smtClean="0"/>
-              <a:t>22.05.2024</a:t>
+              <a:t>23.05.2024</a:t>
             </a:fld>
             <a:endParaRPr lang="de-DE"/>
           </a:p>
@@ -1951,7 +1956,7 @@
           <a:p>
             <a:fld id="{AE4F0B04-D713-46B1-B83F-3E09751D5FCD}" type="datetimeFigureOut">
               <a:rPr lang="de-DE" smtClean="0"/>
-              <a:t>22.05.2024</a:t>
+              <a:t>23.05.2024</a:t>
             </a:fld>
             <a:endParaRPr lang="de-DE"/>
           </a:p>
@@ -2064,7 +2069,7 @@
           <a:p>
             <a:fld id="{AE4F0B04-D713-46B1-B83F-3E09751D5FCD}" type="datetimeFigureOut">
               <a:rPr lang="de-DE" smtClean="0"/>
-              <a:t>22.05.2024</a:t>
+              <a:t>23.05.2024</a:t>
             </a:fld>
             <a:endParaRPr lang="de-DE"/>
           </a:p>
@@ -2375,7 +2380,7 @@
           <a:p>
             <a:fld id="{AE4F0B04-D713-46B1-B83F-3E09751D5FCD}" type="datetimeFigureOut">
               <a:rPr lang="de-DE" smtClean="0"/>
-              <a:t>22.05.2024</a:t>
+              <a:t>23.05.2024</a:t>
             </a:fld>
             <a:endParaRPr lang="de-DE"/>
           </a:p>
@@ -2663,7 +2668,7 @@
           <a:p>
             <a:fld id="{AE4F0B04-D713-46B1-B83F-3E09751D5FCD}" type="datetimeFigureOut">
               <a:rPr lang="de-DE" smtClean="0"/>
-              <a:t>22.05.2024</a:t>
+              <a:t>23.05.2024</a:t>
             </a:fld>
             <a:endParaRPr lang="de-DE"/>
           </a:p>
@@ -2904,7 +2909,7 @@
           <a:p>
             <a:fld id="{AE4F0B04-D713-46B1-B83F-3E09751D5FCD}" type="datetimeFigureOut">
               <a:rPr lang="de-DE" smtClean="0"/>
-              <a:t>22.05.2024</a:t>
+              <a:t>23.05.2024</a:t>
             </a:fld>
             <a:endParaRPr lang="de-DE"/>
           </a:p>
@@ -3476,7 +3481,7 @@
         </p:nvSpPr>
         <p:spPr>
           <a:xfrm>
-            <a:off x="5759450" y="3119756"/>
+            <a:off x="5759450" y="3105470"/>
             <a:ext cx="952500" cy="215444"/>
           </a:xfrm>
           <a:prstGeom prst="rect">
@@ -3511,7 +3516,7 @@
         </p:nvSpPr>
         <p:spPr>
           <a:xfrm>
-            <a:off x="5759450" y="3230881"/>
+            <a:off x="5759450" y="3218976"/>
             <a:ext cx="952500" cy="215444"/>
           </a:xfrm>
           <a:prstGeom prst="rect">

</xml_diff>